<commit_message>
LA SEGUNDA CAPTURA  EN EL PPT INSERCION DE NOMBRES , EN EL XLSX SACAMOS MEDIDAS ESTADISTICAS + INSERCION DE VARIABLE  LUGAR ,  EN EL TXT  CONVERSACION 2 DE FAVORITE
</commit_message>
<xml_diff>
--- a/nombres.pptx
+++ b/nombres.pptx
@@ -6,6 +6,7 @@
   </p:sldMasterIdLst>
   <p:sldIdLst>
     <p:sldId id="256" r:id="rId2"/>
+    <p:sldId id="257" r:id="rId3"/>
   </p:sldIdLst>
   <p:sldSz cx="12192000" cy="6858000"/>
   <p:notesSz cx="6858000" cy="9144000"/>
@@ -3044,7 +3045,7 @@
         </p:blipFill>
         <p:spPr>
           <a:xfrm>
-            <a:off x="-2114" y="3376016"/>
+            <a:off x="-2114" y="3376962"/>
             <a:ext cx="12193057" cy="390178"/>
           </a:xfrm>
           <a:prstGeom prst="rect">
@@ -3088,7 +3089,7 @@
         </p:nvSpPr>
         <p:spPr>
           <a:xfrm>
-            <a:off x="-2114" y="4926617"/>
+            <a:off x="-2114" y="4929981"/>
             <a:ext cx="12192000" cy="387927"/>
           </a:xfrm>
           <a:prstGeom prst="rect">
@@ -3278,10 +3279,219 @@
           </a:p>
         </p:txBody>
       </p:sp>
+      <p:sp>
+        <p:nvSpPr>
+          <p:cNvPr id="13" name="CuadroTexto 12"/>
+          <p:cNvSpPr txBox="1"/>
+          <p:nvPr/>
+        </p:nvSpPr>
+        <p:spPr>
+          <a:xfrm>
+            <a:off x="1107309" y="2718444"/>
+            <a:ext cx="7162800" cy="584775"/>
+          </a:xfrm>
+          <a:prstGeom prst="rect">
+            <a:avLst/>
+          </a:prstGeom>
+          <a:noFill/>
+        </p:spPr>
+        <p:txBody>
+          <a:bodyPr wrap="square" rtlCol="0">
+            <a:spAutoFit/>
+          </a:bodyPr>
+          <a:lstStyle/>
+          <a:p>
+            <a:r>
+              <a:rPr lang="en-US" sz="3200" dirty="0"/>
+              <a:t>Rodrigo Misael </a:t>
+            </a:r>
+            <a:r>
+              <a:rPr lang="en-US" sz="3200" dirty="0" err="1"/>
+              <a:t>Charun</a:t>
+            </a:r>
+            <a:r>
+              <a:rPr lang="en-US" sz="3200" dirty="0"/>
+              <a:t> </a:t>
+            </a:r>
+            <a:r>
+              <a:rPr lang="en-US" sz="3200" dirty="0" err="1"/>
+              <a:t>Gameros</a:t>
+            </a:r>
+            <a:endParaRPr lang="en-US" sz="3200" dirty="0"/>
+          </a:p>
+        </p:txBody>
+      </p:sp>
+      <p:sp>
+        <p:nvSpPr>
+          <p:cNvPr id="14" name="CuadroTexto 13"/>
+          <p:cNvSpPr txBox="1"/>
+          <p:nvPr/>
+        </p:nvSpPr>
+        <p:spPr>
+          <a:xfrm>
+            <a:off x="1219199" y="1878148"/>
+            <a:ext cx="6885710" cy="646331"/>
+          </a:xfrm>
+          <a:prstGeom prst="rect">
+            <a:avLst/>
+          </a:prstGeom>
+          <a:noFill/>
+        </p:spPr>
+        <p:txBody>
+          <a:bodyPr wrap="square" rtlCol="0">
+            <a:spAutoFit/>
+          </a:bodyPr>
+          <a:lstStyle/>
+          <a:p>
+            <a:r>
+              <a:rPr lang="es-ES" sz="3600" dirty="0" smtClean="0"/>
+              <a:t>Iris </a:t>
+            </a:r>
+            <a:r>
+              <a:rPr lang="es-ES" sz="3600" dirty="0" err="1" smtClean="0"/>
+              <a:t>luzbelia</a:t>
+            </a:r>
+            <a:r>
+              <a:rPr lang="es-ES" sz="3600" dirty="0" smtClean="0"/>
+              <a:t> </a:t>
+            </a:r>
+            <a:r>
+              <a:rPr lang="es-ES" sz="3600" dirty="0" err="1" smtClean="0"/>
+              <a:t>sutizal</a:t>
+            </a:r>
+            <a:r>
+              <a:rPr lang="es-ES" sz="3600" dirty="0" smtClean="0"/>
+              <a:t> pablo </a:t>
+            </a:r>
+            <a:endParaRPr lang="en-US" sz="3600" dirty="0"/>
+          </a:p>
+        </p:txBody>
+      </p:sp>
+      <p:sp>
+        <p:nvSpPr>
+          <p:cNvPr id="16" name="CuadroTexto 15"/>
+          <p:cNvSpPr txBox="1"/>
+          <p:nvPr/>
+        </p:nvSpPr>
+        <p:spPr>
+          <a:xfrm>
+            <a:off x="1233056" y="3503491"/>
+            <a:ext cx="6553200" cy="769441"/>
+          </a:xfrm>
+          <a:prstGeom prst="rect">
+            <a:avLst/>
+          </a:prstGeom>
+          <a:noFill/>
+        </p:spPr>
+        <p:txBody>
+          <a:bodyPr wrap="square" rtlCol="0">
+            <a:spAutoFit/>
+          </a:bodyPr>
+          <a:lstStyle/>
+          <a:p>
+            <a:r>
+              <a:rPr lang="en-US" sz="4400" dirty="0" err="1"/>
+              <a:t>Jesús</a:t>
+            </a:r>
+            <a:r>
+              <a:rPr lang="en-US" sz="4400" dirty="0"/>
+              <a:t> </a:t>
+            </a:r>
+            <a:r>
+              <a:rPr lang="en-US" sz="4400" dirty="0" err="1"/>
+              <a:t>Díaz</a:t>
+            </a:r>
+            <a:r>
+              <a:rPr lang="en-US" sz="4400" dirty="0"/>
+              <a:t> </a:t>
+            </a:r>
+            <a:r>
+              <a:rPr lang="en-US" sz="4400" dirty="0" err="1"/>
+              <a:t>Zavaleta</a:t>
+            </a:r>
+            <a:r>
+              <a:rPr lang="en-US" sz="4400" dirty="0"/>
+              <a:t> </a:t>
+            </a:r>
+          </a:p>
+        </p:txBody>
+      </p:sp>
+      <p:sp>
+        <p:nvSpPr>
+          <p:cNvPr id="17" name="CuadroTexto 16"/>
+          <p:cNvSpPr txBox="1"/>
+          <p:nvPr/>
+        </p:nvSpPr>
+        <p:spPr>
+          <a:xfrm>
+            <a:off x="1233055" y="4293429"/>
+            <a:ext cx="7481453" cy="707886"/>
+          </a:xfrm>
+          <a:prstGeom prst="rect">
+            <a:avLst/>
+          </a:prstGeom>
+          <a:noFill/>
+        </p:spPr>
+        <p:txBody>
+          <a:bodyPr wrap="square" rtlCol="0">
+            <a:spAutoFit/>
+          </a:bodyPr>
+          <a:lstStyle/>
+          <a:p>
+            <a:r>
+              <a:rPr lang="en-US" sz="4000" dirty="0" err="1"/>
+              <a:t>Katrin</a:t>
+            </a:r>
+            <a:r>
+              <a:rPr lang="en-US" sz="4000" dirty="0"/>
+              <a:t> </a:t>
+            </a:r>
+            <a:r>
+              <a:rPr lang="en-US" sz="4000" dirty="0" err="1"/>
+              <a:t>Marintia</a:t>
+            </a:r>
+            <a:r>
+              <a:rPr lang="en-US" sz="4000" dirty="0"/>
+              <a:t> Serrano Martinez</a:t>
+            </a:r>
+            <a:endParaRPr lang="en-US" sz="4000" dirty="0"/>
+          </a:p>
+        </p:txBody>
+      </p:sp>
     </p:spTree>
     <p:extLst>
       <p:ext uri="{BB962C8B-B14F-4D97-AF65-F5344CB8AC3E}">
         <p14:creationId xmlns:p14="http://schemas.microsoft.com/office/powerpoint/2010/main" val="533144002"/>
+      </p:ext>
+    </p:extLst>
+  </p:cSld>
+  <p:clrMapOvr>
+    <a:masterClrMapping/>
+  </p:clrMapOvr>
+</p:sld>
+</file>
+
+<file path=ppt/slides/slide2.xml><?xml version="1.0" encoding="utf-8"?>
+<p:sld xmlns:a="http://schemas.openxmlformats.org/drawingml/2006/main" xmlns:r="http://schemas.openxmlformats.org/officeDocument/2006/relationships" xmlns:p="http://schemas.openxmlformats.org/presentationml/2006/main">
+  <p:cSld>
+    <p:spTree>
+      <p:nvGrpSpPr>
+        <p:cNvPr id="1" name=""/>
+        <p:cNvGrpSpPr/>
+        <p:nvPr/>
+      </p:nvGrpSpPr>
+      <p:grpSpPr>
+        <a:xfrm>
+          <a:off x="0" y="0"/>
+          <a:ext cx="0" cy="0"/>
+          <a:chOff x="0" y="0"/>
+          <a:chExt cx="0" cy="0"/>
+        </a:xfrm>
+      </p:grpSpPr>
+    </p:spTree>
+    <p:extLst>
+      <p:ext uri="{BB962C8B-B14F-4D97-AF65-F5344CB8AC3E}">
+        <p14:creationId xmlns:p14="http://schemas.microsoft.com/office/powerpoint/2010/main" val="2995326969"/>
       </p:ext>
     </p:extLst>
   </p:cSld>

</xml_diff>